<commit_message>
- removed PHEM ADVANCE code - restructured Demo / Default Data
</commit_message>
<xml_diff>
--- a/User Manual Source/Update Notes.pptx
+++ b/User Manual Source/Update Notes.pptx
@@ -4490,7 +4490,7 @@
                   <a:srgbClr val="990000"/>
                 </a:solidFill>
               </a:rPr>
-              <a:t>03.09.2013</a:t>
+              <a:t>04.09.2013</a:t>
             </a:r>
           </a:p>
           <a:p>
@@ -4828,7 +4828,7 @@
           <a:p>
             <a:pPr eaLnBrk="1" hangingPunct="1"/>
             <a:r>
-              <a:rPr lang="en-GB" sz="2800" b="0" dirty="0" smtClean="0"/>
+              <a:rPr lang="en-GB" sz="2800" dirty="0" smtClean="0"/>
               <a:t>Motoring in Engine Only Mode</a:t>
             </a:r>
             <a:endParaRPr lang="en-GB" sz="2800" kern="0" dirty="0"/>
@@ -5732,7 +5732,7 @@
           <a:p>
             <a:pPr eaLnBrk="1" hangingPunct="1"/>
             <a:r>
-              <a:rPr lang="en-GB" sz="2800" b="0" dirty="0" smtClean="0"/>
+              <a:rPr lang="en-GB" sz="2800" dirty="0" smtClean="0"/>
               <a:t>Gear-dependent full load curves</a:t>
             </a:r>
             <a:endParaRPr lang="en-GB" sz="2800" kern="0" dirty="0"/>
@@ -6085,6 +6085,43 @@
             <a:r>
               <a:rPr lang="en-GB" sz="2000" b="0" dirty="0"/>
               <a:t>a single gear or a range of gears</a:t>
+            </a:r>
+          </a:p>
+        </p:txBody>
+      </p:sp>
+      <p:sp>
+        <p:nvSpPr>
+          <p:cNvPr id="11" name="Textfeld 10"/>
+          <p:cNvSpPr txBox="1"/>
+          <p:nvPr/>
+        </p:nvSpPr>
+        <p:spPr>
+          <a:xfrm>
+            <a:off x="246496" y="5970766"/>
+            <a:ext cx="7997912" cy="338554"/>
+          </a:xfrm>
+          <a:prstGeom prst="rect">
+            <a:avLst/>
+          </a:prstGeom>
+          <a:noFill/>
+          <a:ln>
+            <a:noFill/>
+          </a:ln>
+        </p:spPr>
+        <p:txBody>
+          <a:bodyPr wrap="square" rtlCol="0">
+            <a:spAutoFit/>
+          </a:bodyPr>
+          <a:lstStyle/>
+          <a:p>
+            <a:pPr algn="l">
+              <a:spcBef>
+                <a:spcPts val="0"/>
+              </a:spcBef>
+            </a:pPr>
+            <a:r>
+              <a:rPr lang="en-GB" b="0" dirty="0" smtClean="0"/>
+              <a:t>Note: Old Engine files (V1.3.1) are compatible with V1.4</a:t>
             </a:r>
           </a:p>
         </p:txBody>
@@ -6308,7 +6345,7 @@
           <a:p>
             <a:pPr eaLnBrk="1" hangingPunct="1"/>
             <a:r>
-              <a:rPr lang="en-GB" sz="2800" b="0" dirty="0" smtClean="0"/>
+              <a:rPr lang="en-GB" sz="2800" dirty="0" smtClean="0"/>
               <a:t>File Signing</a:t>
             </a:r>
             <a:endParaRPr lang="en-GB" sz="2800" kern="0" dirty="0"/>
@@ -6323,8 +6360,8 @@
         </p:nvSpPr>
         <p:spPr>
           <a:xfrm>
-            <a:off x="323529" y="1268760"/>
-            <a:ext cx="8496943" cy="3074624"/>
+            <a:off x="251521" y="1268760"/>
+            <a:ext cx="8568952" cy="2862322"/>
           </a:xfrm>
           <a:prstGeom prst="rect">
             <a:avLst/>
@@ -6349,7 +6386,7 @@
               </a:spcBef>
             </a:pPr>
             <a:r>
-              <a:rPr lang="en-GB" sz="2000" b="0" dirty="0" smtClean="0"/>
+              <a:rPr lang="en-GB" sz="1800" b="0" dirty="0" smtClean="0"/>
               <a:t>File signing ensures that...</a:t>
             </a:r>
           </a:p>
@@ -6365,8 +6402,8 @@
               <a:buChar char="•"/>
             </a:pPr>
             <a:r>
-              <a:rPr lang="en-GB" sz="2000" b="0" dirty="0" smtClean="0"/>
-              <a:t>results files were created by VECTO  and were not modified afterwards</a:t>
+              <a:rPr lang="en-GB" sz="1800" b="0" dirty="0" smtClean="0"/>
+              <a:t>result files were actually created by VECTO and not modified afterwards</a:t>
             </a:r>
           </a:p>
           <a:p>
@@ -6381,7 +6418,7 @@
               <a:buChar char="•"/>
             </a:pPr>
             <a:r>
-              <a:rPr lang="en-GB" sz="2000" b="0" dirty="0" smtClean="0"/>
+              <a:rPr lang="en-GB" sz="1800" b="0" dirty="0" smtClean="0"/>
               <a:t>files were not changed after signing</a:t>
             </a:r>
           </a:p>
@@ -6397,7 +6434,7 @@
               <a:buChar char="•"/>
             </a:pPr>
             <a:r>
-              <a:rPr lang="en-GB" sz="2000" b="0" dirty="0" smtClean="0"/>
+              <a:rPr lang="en-GB" sz="1800" b="0" dirty="0" smtClean="0"/>
               <a:t>specific input files were used for calculation</a:t>
             </a:r>
           </a:p>
@@ -6413,14 +6450,14 @@
               <a:buChar char="•"/>
             </a:pPr>
             <a:r>
-              <a:rPr lang="en-GB" sz="2000" b="0" dirty="0" smtClean="0"/>
-              <a:t>the file's origin (license owner) </a:t>
-            </a:r>
-            <a:r>
-              <a:rPr lang="en-GB" sz="2000" b="0" dirty="0"/>
+              <a:rPr lang="en-GB" sz="1800" b="0" dirty="0" smtClean="0"/>
+              <a:t>a file's origin (license owner) </a:t>
+            </a:r>
+            <a:r>
+              <a:rPr lang="en-GB" sz="1800" b="0" dirty="0"/>
               <a:t>is traceable</a:t>
             </a:r>
-            <a:endParaRPr lang="en-GB" sz="2000" b="0" dirty="0" smtClean="0"/>
+            <a:endParaRPr lang="en-GB" sz="1800" b="0" dirty="0" smtClean="0"/>
           </a:p>
         </p:txBody>
       </p:sp>
@@ -6697,7 +6734,7 @@
           <a:p>
             <a:pPr eaLnBrk="1" hangingPunct="1"/>
             <a:r>
-              <a:rPr lang="en-GB" sz="2800" b="0" dirty="0" smtClean="0"/>
+              <a:rPr lang="en-GB" sz="2800" dirty="0" smtClean="0"/>
               <a:t>File Signing</a:t>
             </a:r>
             <a:endParaRPr lang="en-GB" sz="2800" kern="0" dirty="0"/>
@@ -7066,7 +7103,31 @@
             </a:pPr>
             <a:r>
               <a:rPr lang="en-GB" sz="1200" b="0" dirty="0" smtClean="0"/>
-              <a:t>When verifying it can be checked if the file was automatically or user-created. (Automatically created files include input and result file signatures.)</a:t>
+              <a:t>When verifying it can be checked if the file was </a:t>
+            </a:r>
+            <a:r>
+              <a:rPr lang="en-GB" sz="1200" b="0" dirty="0" smtClean="0">
+                <a:solidFill>
+                  <a:srgbClr val="00B050"/>
+                </a:solidFill>
+              </a:rPr>
+              <a:t>automatically</a:t>
+            </a:r>
+            <a:r>
+              <a:rPr lang="en-GB" sz="1200" b="0" dirty="0" smtClean="0"/>
+              <a:t> or </a:t>
+            </a:r>
+            <a:r>
+              <a:rPr lang="en-GB" sz="1200" b="0" dirty="0" smtClean="0">
+                <a:solidFill>
+                  <a:srgbClr val="FF0000"/>
+                </a:solidFill>
+              </a:rPr>
+              <a:t>user-created</a:t>
+            </a:r>
+            <a:r>
+              <a:rPr lang="en-GB" sz="1200" b="0" dirty="0" smtClean="0"/>
+              <a:t>. (Automatically created files include input and result file signatures.)</a:t>
             </a:r>
           </a:p>
         </p:txBody>
@@ -7295,7 +7356,7 @@
         <p:spPr>
           <a:xfrm>
             <a:off x="179512" y="1414512"/>
-            <a:ext cx="8784976" cy="3447098"/>
+            <a:ext cx="8784976" cy="3893374"/>
           </a:xfrm>
           <a:prstGeom prst="rect">
             <a:avLst/>
@@ -7393,23 +7454,48 @@
                   <a:srgbClr val="C00000"/>
                 </a:solidFill>
               </a:rPr>
-              <a:t>: Vehicle stand-still at end of cycle </a:t>
-            </a:r>
-            <a:r>
-              <a:rPr lang="en-GB" sz="1200" b="0">
+              <a:t>: Vehicle stand-still at end of cycle was ignored (distance-based cycles only</a:t>
+            </a:r>
+            <a:r>
+              <a:rPr lang="en-GB" sz="1200" b="0" dirty="0" smtClean="0">
                 <a:solidFill>
                   <a:srgbClr val="C00000"/>
                 </a:solidFill>
               </a:rPr>
-              <a:t>was </a:t>
-            </a:r>
-            <a:r>
-              <a:rPr lang="en-GB" sz="1200" b="0">
+              <a:t>)</a:t>
+            </a:r>
+          </a:p>
+          <a:p>
+            <a:pPr marL="171450" indent="-171450" algn="l">
+              <a:spcBef>
+                <a:spcPts val="600"/>
+              </a:spcBef>
+              <a:buFont typeface="Arial" pitchFamily="34" charset="0"/>
+              <a:buChar char="•"/>
+            </a:pPr>
+            <a:r>
+              <a:rPr lang="en-GB" sz="1200" b="0" dirty="0" err="1">
                 <a:solidFill>
                   <a:srgbClr val="C00000"/>
                 </a:solidFill>
               </a:rPr>
-              <a:t>ignored (distance-based cycles only)</a:t>
+              <a:t>Bugfix</a:t>
+            </a:r>
+            <a:r>
+              <a:rPr lang="en-GB" sz="1200" b="0" dirty="0">
+                <a:solidFill>
+                  <a:srgbClr val="C00000"/>
+                </a:solidFill>
+              </a:rPr>
+              <a:t>: Distance Correction didn't work right with Look Ahead Coasting. Now distance error is acceptable but at the cost of partly interrupted coasting phases. Should be revised in future updates</a:t>
+            </a:r>
+            <a:r>
+              <a:rPr lang="en-GB" sz="1200" b="0" dirty="0" smtClean="0">
+                <a:solidFill>
+                  <a:srgbClr val="C00000"/>
+                </a:solidFill>
+              </a:rPr>
+              <a:t>.</a:t>
             </a:r>
             <a:endParaRPr lang="en-GB" sz="1200" b="0" dirty="0">
               <a:solidFill>
@@ -7650,7 +7736,7 @@
         <p:spPr>
           <a:xfrm>
             <a:off x="179512" y="1414512"/>
-            <a:ext cx="8784976" cy="4816703"/>
+            <a:ext cx="8784976" cy="4308872"/>
           </a:xfrm>
           <a:prstGeom prst="rect">
             <a:avLst/>
@@ -7803,12 +7889,12 @@
               <a:t>Cycle </a:t>
             </a:r>
             <a:r>
-              <a:rPr lang="en-GB" sz="1200" b="0" dirty="0" err="1"/>
-              <a:t>Preprocessing</a:t>
+              <a:rPr lang="en-GB" sz="1200" b="0" dirty="0" smtClean="0"/>
+              <a:t>Pre-processing </a:t>
             </a:r>
             <a:r>
               <a:rPr lang="en-GB" sz="1200" b="0" dirty="0"/>
-              <a:t> and Gear Shift Model now use approximated efficiency values based in the transmission loss maps. Reduces calculation time significantly with little to no impact on fuel consumption.</a:t>
+              <a:t>and Gear Shift Model now use approximated efficiency values based in the transmission loss maps. Reduces calculation time significantly with little to no impact on fuel consumption.</a:t>
             </a:r>
           </a:p>
           <a:p>
@@ -7834,31 +7920,6 @@
             <a:r>
               <a:rPr lang="en-GB" sz="1200" b="0" dirty="0"/>
               <a:t>) can be defined for each gear separately.</a:t>
-            </a:r>
-          </a:p>
-          <a:p>
-            <a:pPr marL="171450" indent="-171450" algn="l">
-              <a:spcBef>
-                <a:spcPts val="600"/>
-              </a:spcBef>
-              <a:buFont typeface="Arial" pitchFamily="34" charset="0"/>
-              <a:buChar char="•"/>
-            </a:pPr>
-            <a:r>
-              <a:rPr lang="en-GB" sz="1200" b="0" dirty="0" err="1" smtClean="0">
-                <a:solidFill>
-                  <a:srgbClr val="C00000"/>
-                </a:solidFill>
-              </a:rPr>
-              <a:t>Bugfix</a:t>
-            </a:r>
-            <a:r>
-              <a:rPr lang="en-GB" sz="1200" b="0" dirty="0">
-                <a:solidFill>
-                  <a:srgbClr val="C00000"/>
-                </a:solidFill>
-              </a:rPr>
-              <a:t>: Distance Correction didn't work right with Look Ahead Coasting. Now distance error is acceptable but at the cost of partly interrupted coasting phases. Should be revised in future updates.</a:t>
             </a:r>
           </a:p>
           <a:p>
@@ -12527,7 +12588,7 @@
           <a:p>
             <a:pPr eaLnBrk="1" hangingPunct="1"/>
             <a:r>
-              <a:rPr lang="en-GB" sz="2800" smtClean="0"/>
+              <a:rPr lang="en-GB" sz="2800" dirty="0" smtClean="0"/>
               <a:t>Gearbox updates</a:t>
             </a:r>
             <a:endParaRPr lang="en-GB" sz="2800" dirty="0"/>
@@ -12847,7 +12908,7 @@
         </p:nvGraphicFramePr>
         <p:xfrm>
           <a:off x="755576" y="3429000"/>
-          <a:ext cx="3384375" cy="1720855"/>
+          <a:ext cx="3384375" cy="1733110"/>
         </p:xfrm>
         <a:graphic>
           <a:graphicData uri="http://schemas.openxmlformats.org/drawingml/2006/table">
@@ -21959,11 +22020,11 @@
           <a:p>
             <a:pPr eaLnBrk="1" hangingPunct="1"/>
             <a:r>
-              <a:rPr lang="en-GB" sz="2800" b="0"/>
+              <a:rPr lang="en-GB" sz="2800" dirty="0"/>
               <a:t>Look-Ahead </a:t>
             </a:r>
             <a:r>
-              <a:rPr lang="en-GB" sz="2800" b="0" smtClean="0"/>
+              <a:rPr lang="en-GB" sz="2800" dirty="0" smtClean="0"/>
               <a:t>Coasting</a:t>
             </a:r>
             <a:endParaRPr lang="en-GB" sz="2800" kern="0" dirty="0"/>
@@ -22000,7 +22061,7 @@
               <a:buChar char="•"/>
             </a:pPr>
             <a:r>
-              <a:rPr lang="en-GB" sz="2000" b="0" smtClean="0"/>
+              <a:rPr lang="en-GB" sz="2000" b="0" dirty="0" smtClean="0"/>
               <a:t>Real coasting </a:t>
             </a:r>
             <a:r>
@@ -22023,38 +22084,26 @@
             </a:r>
             <a:r>
               <a:rPr lang="en-GB" sz="2000" b="0" dirty="0"/>
-              <a:t>be so high that </a:t>
-            </a:r>
-            <a:r>
-              <a:rPr lang="en-GB" sz="2000" b="0"/>
-              <a:t>no </a:t>
-            </a:r>
-            <a:r>
-              <a:rPr lang="en-GB" sz="2000" b="0" smtClean="0"/>
+              <a:t>be so high that no </a:t>
+            </a:r>
+            <a:r>
+              <a:rPr lang="en-GB" sz="2000" b="0" dirty="0" smtClean="0"/>
               <a:t>braking </a:t>
             </a:r>
             <a:r>
               <a:rPr lang="en-GB" sz="2000" b="0" dirty="0"/>
-              <a:t>is necessary</a:t>
-            </a:r>
-            <a:r>
-              <a:rPr lang="en-GB" sz="2000" b="0"/>
-              <a:t>. </a:t>
-            </a:r>
-            <a:r>
-              <a:rPr lang="en-GB" sz="2000" b="0" smtClean="0"/>
+              <a:t>is necessary. </a:t>
+            </a:r>
+            <a:r>
+              <a:rPr lang="en-GB" sz="2000" b="0" dirty="0" smtClean="0"/>
               <a:t>In </a:t>
             </a:r>
             <a:r>
               <a:rPr lang="en-GB" sz="2000" b="0" dirty="0"/>
-              <a:t>this case </a:t>
-            </a:r>
-            <a:r>
-              <a:rPr lang="en-GB" sz="2000" b="0"/>
-              <a:t>the </a:t>
-            </a:r>
-            <a:r>
-              <a:rPr lang="en-GB" sz="2000" b="0" smtClean="0"/>
+              <a:t>this case the </a:t>
+            </a:r>
+            <a:r>
+              <a:rPr lang="en-GB" sz="2000" b="0" dirty="0" smtClean="0"/>
               <a:t>braking </a:t>
             </a:r>
             <a:r>
@@ -22067,15 +22116,7 @@
             </a:r>
             <a:r>
               <a:rPr lang="en-GB" b="0" dirty="0" smtClean="0"/>
-              <a:t>(Before </a:t>
-            </a:r>
-            <a:r>
-              <a:rPr lang="en-GB" b="0" smtClean="0"/>
-              <a:t>V1.4 coasting </a:t>
-            </a:r>
-            <a:r>
-              <a:rPr lang="en-GB" b="0" dirty="0" smtClean="0"/>
-              <a:t>was not affected by </a:t>
+              <a:t>(Before V1.4 coasting was not affected by </a:t>
             </a:r>
             <a:r>
               <a:rPr lang="en-GB" b="0" dirty="0"/>
@@ -22097,16 +22138,12 @@
               <a:t>Distance Correction now also </a:t>
             </a:r>
             <a:r>
-              <a:rPr lang="en-GB" sz="2000" b="0"/>
+              <a:rPr lang="en-GB" sz="2000" b="0" dirty="0"/>
               <a:t>affects </a:t>
             </a:r>
             <a:r>
-              <a:rPr lang="en-GB" sz="2000" b="0" smtClean="0"/>
-              <a:t>coasting </a:t>
-            </a:r>
-            <a:r>
               <a:rPr lang="en-GB" sz="2000" b="0" dirty="0" smtClean="0"/>
-              <a:t>phases</a:t>
+              <a:t>coasting phases</a:t>
             </a:r>
           </a:p>
           <a:p>
@@ -22125,38 +22162,30 @@
               <a:buChar char="Ø"/>
             </a:pPr>
             <a:r>
-              <a:rPr lang="en-GB" sz="2000" b="0" smtClean="0"/>
-              <a:t>Coasting </a:t>
-            </a:r>
-            <a:r>
               <a:rPr lang="en-GB" sz="2000" b="0" dirty="0" smtClean="0"/>
-              <a:t>phases may </a:t>
-            </a:r>
-            <a:r>
-              <a:rPr lang="en-GB" sz="2000" b="0"/>
+              <a:t>Coasting phases may </a:t>
+            </a:r>
+            <a:r>
+              <a:rPr lang="en-GB" sz="2000" b="0" dirty="0"/>
               <a:t>be </a:t>
             </a:r>
             <a:r>
-              <a:rPr lang="en-GB" sz="2000" b="0" smtClean="0"/>
-              <a:t>interrupted </a:t>
-            </a:r>
-            <a:r>
               <a:rPr lang="en-GB" sz="2000" b="0" dirty="0" smtClean="0"/>
-              <a:t>temporary to correct distance. </a:t>
-            </a:r>
-            <a:r>
-              <a:rPr lang="en-GB" b="0" dirty="0" smtClean="0"/>
-              <a:t>(To be </a:t>
-            </a:r>
-            <a:r>
-              <a:rPr lang="en-GB" b="0" smtClean="0"/>
-              <a:t>revised in </a:t>
-            </a:r>
-            <a:r>
-              <a:rPr lang="en-GB" b="0" dirty="0" smtClean="0"/>
-              <a:t>future updates)</a:t>
-            </a:r>
-            <a:endParaRPr lang="en-GB" sz="2000" b="0" dirty="0"/>
+              <a:t>interrupted temporary to correct distance. </a:t>
+            </a:r>
+            <a:r>
+              <a:rPr lang="en-GB" b="0" u="sng" dirty="0" smtClean="0">
+                <a:solidFill>
+                  <a:srgbClr val="FF0000"/>
+                </a:solidFill>
+              </a:rPr>
+              <a:t>(To be revised in future updates)</a:t>
+            </a:r>
+            <a:endParaRPr lang="en-GB" sz="2000" b="0" u="sng" dirty="0">
+              <a:solidFill>
+                <a:srgbClr val="FF0000"/>
+              </a:solidFill>
+            </a:endParaRPr>
           </a:p>
         </p:txBody>
       </p:sp>
@@ -30397,11 +30426,11 @@
           <a:p>
             <a:pPr eaLnBrk="1" hangingPunct="1"/>
             <a:r>
-              <a:rPr lang="en-GB" sz="2800" b="0" dirty="0" smtClean="0"/>
+              <a:rPr lang="en-GB" sz="2800" dirty="0" smtClean="0"/>
               <a:t>Gearbox &amp; Toque </a:t>
             </a:r>
             <a:r>
-              <a:rPr lang="en-GB" sz="2800" b="0" dirty="0"/>
+              <a:rPr lang="en-GB" sz="2800" dirty="0"/>
               <a:t>Converter</a:t>
             </a:r>
             <a:endParaRPr lang="en-GB" sz="2800" kern="0" dirty="0"/>
@@ -30763,6 +30792,43 @@
               <a:effectLst/>
               <a:latin typeface="Arial" pitchFamily="34" charset="0"/>
             </a:endParaRPr>
+          </a:p>
+        </p:txBody>
+      </p:sp>
+      <p:sp>
+        <p:nvSpPr>
+          <p:cNvPr id="11" name="Textfeld 10"/>
+          <p:cNvSpPr txBox="1"/>
+          <p:nvPr/>
+        </p:nvSpPr>
+        <p:spPr>
+          <a:xfrm>
+            <a:off x="246496" y="5507940"/>
+            <a:ext cx="7997912" cy="338554"/>
+          </a:xfrm>
+          <a:prstGeom prst="rect">
+            <a:avLst/>
+          </a:prstGeom>
+          <a:noFill/>
+          <a:ln>
+            <a:noFill/>
+          </a:ln>
+        </p:spPr>
+        <p:txBody>
+          <a:bodyPr wrap="square" rtlCol="0">
+            <a:spAutoFit/>
+          </a:bodyPr>
+          <a:lstStyle/>
+          <a:p>
+            <a:pPr algn="l">
+              <a:spcBef>
+                <a:spcPts val="0"/>
+              </a:spcBef>
+            </a:pPr>
+            <a:r>
+              <a:rPr lang="en-GB" b="0" dirty="0" smtClean="0"/>
+              <a:t>Note: Old Gearbox files (V1.3.1) are compatible with V1.4</a:t>
+            </a:r>
           </a:p>
         </p:txBody>
       </p:sp>
@@ -31077,11 +31143,11 @@
           <a:p>
             <a:pPr eaLnBrk="1" hangingPunct="1"/>
             <a:r>
-              <a:rPr lang="en-GB" sz="2800" b="0" dirty="0" smtClean="0"/>
+              <a:rPr lang="en-GB" sz="2800" dirty="0" smtClean="0"/>
               <a:t>Gearbox &amp; Toque </a:t>
             </a:r>
             <a:r>
-              <a:rPr lang="en-GB" sz="2800" b="0" dirty="0"/>
+              <a:rPr lang="en-GB" sz="2800" dirty="0"/>
               <a:t>Converter</a:t>
             </a:r>
             <a:endParaRPr lang="en-GB" sz="2800" kern="0" dirty="0"/>
@@ -31115,8 +31181,12 @@
           <a:p>
             <a:pPr algn="l"/>
             <a:r>
+              <a:rPr lang="en-GB" sz="2000" u="sng" dirty="0"/>
+              <a:t>Example</a:t>
+            </a:r>
+            <a:r>
               <a:rPr lang="en-GB" sz="2000" dirty="0"/>
-              <a:t>Example: Torque converter active in first and second </a:t>
+              <a:t>: Torque converter active in first and second </a:t>
             </a:r>
             <a:r>
               <a:rPr lang="en-GB" sz="2000" dirty="0" smtClean="0"/>
@@ -31253,7 +31323,7 @@
         </p:nvSpPr>
         <p:spPr>
           <a:xfrm>
-            <a:off x="212557" y="5517232"/>
+            <a:off x="149159" y="5886564"/>
             <a:ext cx="7455787" cy="369332"/>
           </a:xfrm>
           <a:prstGeom prst="rect">
@@ -31277,7 +31347,7 @@
             </a:pPr>
             <a:r>
               <a:rPr lang="en-GB" sz="1800" b="0" dirty="0" smtClean="0"/>
-              <a:t>* TC active = Torque converter active = lock-up clutch open</a:t>
+              <a:t>* TC active = lock-up clutch open</a:t>
             </a:r>
           </a:p>
         </p:txBody>
@@ -31436,6 +31506,43 @@
             <a:r>
               <a:rPr lang="en-GB" sz="1800" b="0" dirty="0" smtClean="0"/>
               <a:t>ratio)</a:t>
+            </a:r>
+          </a:p>
+        </p:txBody>
+      </p:sp>
+      <p:sp>
+        <p:nvSpPr>
+          <p:cNvPr id="11" name="Textfeld 10"/>
+          <p:cNvSpPr txBox="1"/>
+          <p:nvPr/>
+        </p:nvSpPr>
+        <p:spPr>
+          <a:xfrm>
+            <a:off x="246496" y="5157192"/>
+            <a:ext cx="8897504" cy="369332"/>
+          </a:xfrm>
+          <a:prstGeom prst="rect">
+            <a:avLst/>
+          </a:prstGeom>
+          <a:noFill/>
+          <a:ln>
+            <a:noFill/>
+          </a:ln>
+        </p:spPr>
+        <p:txBody>
+          <a:bodyPr wrap="square" rtlCol="0">
+            <a:spAutoFit/>
+          </a:bodyPr>
+          <a:lstStyle/>
+          <a:p>
+            <a:pPr algn="l">
+              <a:spcBef>
+                <a:spcPts val="0"/>
+              </a:spcBef>
+            </a:pPr>
+            <a:r>
+              <a:rPr lang="en-GB" sz="1800" dirty="0" smtClean="0"/>
+              <a:t>Note: Gear numbers in results are the same as here (i.e. no more "0.5" gear)!</a:t>
             </a:r>
           </a:p>
         </p:txBody>
@@ -31710,7 +31817,7 @@
           <a:p>
             <a:pPr eaLnBrk="1" hangingPunct="1"/>
             <a:r>
-              <a:rPr lang="en-GB" sz="2800" b="0" dirty="0" smtClean="0"/>
+              <a:rPr lang="en-GB" sz="2800" dirty="0" smtClean="0"/>
               <a:t>Toque Converter Setup</a:t>
             </a:r>
             <a:endParaRPr lang="en-GB" sz="2800" kern="0" dirty="0"/>
@@ -31726,7 +31833,7 @@
         <p:spPr>
           <a:xfrm>
             <a:off x="246496" y="1412776"/>
-            <a:ext cx="5652871" cy="3354765"/>
+            <a:ext cx="7637872" cy="3354765"/>
           </a:xfrm>
           <a:prstGeom prst="rect">
             <a:avLst/>
@@ -31888,7 +31995,7 @@
             </a:pPr>
             <a:r>
               <a:rPr lang="en-GB" b="0" dirty="0" smtClean="0"/>
-              <a:t>Set transmission losses (map or constant efficiency)</a:t>
+              <a:t>Set transmission losses of first gear (map or constant efficiency)</a:t>
             </a:r>
             <a:endParaRPr lang="en-GB" b="0" dirty="0"/>
           </a:p>
@@ -33060,7 +33167,7 @@
         <p:spPr>
           <a:xfrm flipH="1">
             <a:off x="1777495" y="3202920"/>
-            <a:ext cx="56244" cy="0"/>
+            <a:ext cx="719042" cy="0"/>
           </a:xfrm>
           <a:prstGeom prst="line">
             <a:avLst/>
@@ -33551,7 +33658,7 @@
             <a:r>
               <a:rPr lang="en-GB" sz="1200" dirty="0" err="1" smtClean="0">
                 <a:solidFill>
-                  <a:schemeClr val="accent5">
+                  <a:schemeClr val="accent6">
                     <a:lumMod val="75000"/>
                   </a:schemeClr>
                 </a:solidFill>
@@ -33561,7 +33668,7 @@
             <a:r>
               <a:rPr lang="en-GB" sz="1200" baseline="-25000" dirty="0" err="1" smtClean="0">
                 <a:solidFill>
-                  <a:schemeClr val="accent5">
+                  <a:schemeClr val="accent6">
                     <a:lumMod val="75000"/>
                   </a:schemeClr>
                 </a:solidFill>
@@ -33665,7 +33772,7 @@
             <a:r>
               <a:rPr lang="de-AT" sz="1200" dirty="0" err="1" smtClean="0">
                 <a:solidFill>
-                  <a:schemeClr val="accent5">
+                  <a:schemeClr val="accent6">
                     <a:lumMod val="75000"/>
                   </a:schemeClr>
                 </a:solidFill>
@@ -33676,7 +33783,7 @@
             <a:r>
               <a:rPr lang="de-AT" sz="1200" baseline="-25000" dirty="0" err="1" smtClean="0">
                 <a:solidFill>
-                  <a:schemeClr val="accent5">
+                  <a:schemeClr val="accent6">
                     <a:lumMod val="75000"/>
                   </a:schemeClr>
                 </a:solidFill>
@@ -34185,8 +34292,8 @@
         </p:nvSpPr>
         <p:spPr>
           <a:xfrm>
-            <a:off x="2064713" y="3539791"/>
-            <a:ext cx="822537" cy="384078"/>
+            <a:off x="2018917" y="3539791"/>
+            <a:ext cx="896899" cy="384078"/>
           </a:xfrm>
           <a:prstGeom prst="rect">
             <a:avLst/>
@@ -34207,7 +34314,7 @@
             <a:r>
               <a:rPr lang="en-GB" sz="1200" dirty="0" err="1" smtClean="0">
                 <a:solidFill>
-                  <a:schemeClr val="accent5">
+                  <a:schemeClr val="accent6">
                     <a:lumMod val="75000"/>
                   </a:schemeClr>
                 </a:solidFill>
@@ -34217,7 +34324,7 @@
             <a:r>
               <a:rPr lang="en-GB" sz="1200" baseline="-25000" dirty="0" err="1" smtClean="0">
                 <a:solidFill>
-                  <a:schemeClr val="accent5">
+                  <a:schemeClr val="accent6">
                     <a:lumMod val="75000"/>
                   </a:schemeClr>
                 </a:solidFill>
@@ -34227,7 +34334,7 @@
             <a:r>
               <a:rPr lang="en-GB" sz="1200" dirty="0" smtClean="0">
                 <a:solidFill>
-                  <a:schemeClr val="accent5">
+                  <a:schemeClr val="accent6">
                     <a:lumMod val="75000"/>
                   </a:schemeClr>
                 </a:solidFill>
@@ -34237,7 +34344,7 @@
             <a:r>
               <a:rPr lang="de-AT" sz="1200" dirty="0" err="1" smtClean="0">
                 <a:solidFill>
-                  <a:schemeClr val="accent5">
+                  <a:schemeClr val="accent6">
                     <a:lumMod val="75000"/>
                   </a:schemeClr>
                 </a:solidFill>
@@ -34248,7 +34355,7 @@
             <a:r>
               <a:rPr lang="de-AT" sz="1200" baseline="-25000" dirty="0" err="1" smtClean="0">
                 <a:solidFill>
-                  <a:schemeClr val="accent5">
+                  <a:schemeClr val="accent6">
                     <a:lumMod val="75000"/>
                   </a:schemeClr>
                 </a:solidFill>
@@ -34256,9 +34363,9 @@
               </a:rPr>
               <a:t>out</a:t>
             </a:r>
-            <a:endParaRPr lang="de-AT" sz="1200" baseline="-25000" dirty="0">
+            <a:endParaRPr lang="de-AT" sz="1000" baseline="-25000" dirty="0">
               <a:solidFill>
-                <a:schemeClr val="accent5">
+                <a:schemeClr val="accent6">
                   <a:lumMod val="75000"/>
                 </a:schemeClr>
               </a:solidFill>
@@ -34543,6 +34650,273 @@
           </a:extLst>
         </p:spPr>
       </p:cxnSp>
+      <p:sp>
+        <p:nvSpPr>
+          <p:cNvPr id="58" name="Textfeld 57"/>
+          <p:cNvSpPr txBox="1"/>
+          <p:nvPr/>
+        </p:nvSpPr>
+        <p:spPr>
+          <a:xfrm>
+            <a:off x="5652120" y="3512041"/>
+            <a:ext cx="2071977" cy="276999"/>
+          </a:xfrm>
+          <a:prstGeom prst="rect">
+            <a:avLst/>
+          </a:prstGeom>
+          <a:noFill/>
+          <a:ln>
+            <a:noFill/>
+          </a:ln>
+        </p:spPr>
+        <p:txBody>
+          <a:bodyPr wrap="none" rtlCol="0">
+            <a:spAutoFit/>
+          </a:bodyPr>
+          <a:lstStyle/>
+          <a:p>
+            <a:pPr algn="l">
+              <a:spcBef>
+                <a:spcPts val="0"/>
+              </a:spcBef>
+            </a:pPr>
+            <a:r>
+              <a:rPr lang="en-GB" sz="1200" b="0" dirty="0" smtClean="0"/>
+              <a:t>Torque Converter file (.</a:t>
+            </a:r>
+            <a:r>
+              <a:rPr lang="en-GB" sz="1200" b="0" dirty="0" err="1" smtClean="0"/>
+              <a:t>vtcc</a:t>
+            </a:r>
+            <a:r>
+              <a:rPr lang="en-GB" sz="1200" b="0" dirty="0" smtClean="0"/>
+              <a:t>)</a:t>
+            </a:r>
+          </a:p>
+        </p:txBody>
+      </p:sp>
+      <p:cxnSp>
+        <p:nvCxnSpPr>
+          <p:cNvPr id="61" name="Gerade Verbindung mit Pfeil 60"/>
+          <p:cNvCxnSpPr/>
+          <p:nvPr/>
+        </p:nvCxnSpPr>
+        <p:spPr bwMode="auto">
+          <a:xfrm flipH="1">
+            <a:off x="1330371" y="2972174"/>
+            <a:ext cx="207540" cy="0"/>
+          </a:xfrm>
+          <a:prstGeom prst="straightConnector1">
+            <a:avLst/>
+          </a:prstGeom>
+          <a:solidFill>
+            <a:schemeClr val="accent1"/>
+          </a:solidFill>
+          <a:ln w="12700" cap="flat" cmpd="sng" algn="ctr">
+            <a:solidFill>
+              <a:schemeClr val="tx1"/>
+            </a:solidFill>
+            <a:prstDash val="solid"/>
+            <a:round/>
+            <a:headEnd type="none" w="med" len="med"/>
+            <a:tailEnd type="arrow"/>
+          </a:ln>
+          <a:effectLst/>
+          <a:extLst>
+            <a:ext uri="{AF507438-7753-43E0-B8FC-AC1667EBCBE1}">
+              <a14:hiddenEffects xmlns:a14="http://schemas.microsoft.com/office/drawing/2010/main">
+                <a:effectLst>
+                  <a:outerShdw dist="35921" dir="2700000" algn="ctr" rotWithShape="0">
+                    <a:schemeClr val="bg2"/>
+                  </a:outerShdw>
+                </a:effectLst>
+              </a14:hiddenEffects>
+            </a:ext>
+          </a:extLst>
+        </p:spPr>
+      </p:cxnSp>
+      <p:sp>
+        <p:nvSpPr>
+          <p:cNvPr id="62" name="Textfeld 61"/>
+          <p:cNvSpPr txBox="1"/>
+          <p:nvPr/>
+        </p:nvSpPr>
+        <p:spPr>
+          <a:xfrm>
+            <a:off x="551502" y="3458501"/>
+            <a:ext cx="996162" cy="384078"/>
+          </a:xfrm>
+          <a:prstGeom prst="rect">
+            <a:avLst/>
+          </a:prstGeom>
+          <a:noFill/>
+        </p:spPr>
+        <p:txBody>
+          <a:bodyPr wrap="square" rtlCol="0">
+            <a:noAutofit/>
+          </a:bodyPr>
+          <a:lstStyle/>
+          <a:p>
+            <a:pPr>
+              <a:lnSpc>
+                <a:spcPct val="150000"/>
+              </a:lnSpc>
+            </a:pPr>
+            <a:r>
+              <a:rPr lang="de-AT" sz="1000" dirty="0" err="1" smtClean="0">
+                <a:solidFill>
+                  <a:schemeClr val="bg1">
+                    <a:lumMod val="50000"/>
+                  </a:schemeClr>
+                </a:solidFill>
+                <a:latin typeface="Calibri"/>
+              </a:rPr>
+              <a:t>Gearbox</a:t>
+            </a:r>
+            <a:r>
+              <a:rPr lang="de-AT" sz="1000" dirty="0" smtClean="0">
+                <a:solidFill>
+                  <a:schemeClr val="bg1">
+                    <a:lumMod val="50000"/>
+                  </a:schemeClr>
+                </a:solidFill>
+                <a:latin typeface="Calibri"/>
+              </a:rPr>
+              <a:t> Out</a:t>
+            </a:r>
+            <a:endParaRPr lang="de-AT" sz="1000" baseline="-25000" dirty="0">
+              <a:solidFill>
+                <a:schemeClr val="bg1">
+                  <a:lumMod val="50000"/>
+                </a:schemeClr>
+              </a:solidFill>
+            </a:endParaRPr>
+          </a:p>
+        </p:txBody>
+      </p:sp>
+      <p:cxnSp>
+        <p:nvCxnSpPr>
+          <p:cNvPr id="63" name="Gerade Verbindung 62"/>
+          <p:cNvCxnSpPr/>
+          <p:nvPr/>
+        </p:nvCxnSpPr>
+        <p:spPr bwMode="auto">
+          <a:xfrm flipV="1">
+            <a:off x="1186617" y="3104257"/>
+            <a:ext cx="247524" cy="359614"/>
+          </a:xfrm>
+          <a:prstGeom prst="line">
+            <a:avLst/>
+          </a:prstGeom>
+          <a:solidFill>
+            <a:schemeClr val="accent1"/>
+          </a:solidFill>
+          <a:ln w="12700" cap="flat" cmpd="sng" algn="ctr">
+            <a:solidFill>
+              <a:schemeClr val="bg1">
+                <a:lumMod val="50000"/>
+              </a:schemeClr>
+            </a:solidFill>
+            <a:prstDash val="solid"/>
+            <a:round/>
+            <a:headEnd type="none" w="med" len="med"/>
+            <a:tailEnd type="none" w="med" len="med"/>
+          </a:ln>
+          <a:effectLst/>
+          <a:extLst>
+            <a:ext uri="{AF507438-7753-43E0-B8FC-AC1667EBCBE1}">
+              <a14:hiddenEffects xmlns:a14="http://schemas.microsoft.com/office/drawing/2010/main">
+                <a:effectLst>
+                  <a:outerShdw dist="35921" dir="2700000" algn="ctr" rotWithShape="0">
+                    <a:schemeClr val="bg2"/>
+                  </a:outerShdw>
+                </a:effectLst>
+              </a14:hiddenEffects>
+            </a:ext>
+          </a:extLst>
+        </p:spPr>
+      </p:cxnSp>
+      <p:sp>
+        <p:nvSpPr>
+          <p:cNvPr id="66" name="Textfeld 65"/>
+          <p:cNvSpPr txBox="1"/>
+          <p:nvPr/>
+        </p:nvSpPr>
+        <p:spPr>
+          <a:xfrm>
+            <a:off x="2027539" y="3770575"/>
+            <a:ext cx="1009046" cy="384078"/>
+          </a:xfrm>
+          <a:prstGeom prst="rect">
+            <a:avLst/>
+          </a:prstGeom>
+          <a:noFill/>
+        </p:spPr>
+        <p:txBody>
+          <a:bodyPr wrap="square" rtlCol="0">
+            <a:noAutofit/>
+          </a:bodyPr>
+          <a:lstStyle/>
+          <a:p>
+            <a:pPr>
+              <a:lnSpc>
+                <a:spcPct val="150000"/>
+              </a:lnSpc>
+            </a:pPr>
+            <a:r>
+              <a:rPr lang="de-AT" sz="1000" dirty="0" smtClean="0">
+                <a:solidFill>
+                  <a:schemeClr val="bg1">
+                    <a:lumMod val="50000"/>
+                  </a:schemeClr>
+                </a:solidFill>
+                <a:latin typeface="Calibri"/>
+              </a:rPr>
+              <a:t>= </a:t>
+            </a:r>
+            <a:r>
+              <a:rPr lang="de-AT" sz="1000" dirty="0" err="1">
+                <a:solidFill>
+                  <a:schemeClr val="bg1">
+                    <a:lumMod val="50000"/>
+                  </a:schemeClr>
+                </a:solidFill>
+                <a:latin typeface="Calibri"/>
+              </a:rPr>
+              <a:t>Gearbox</a:t>
+            </a:r>
+            <a:r>
+              <a:rPr lang="de-AT" sz="1000" dirty="0">
+                <a:solidFill>
+                  <a:schemeClr val="bg1">
+                    <a:lumMod val="50000"/>
+                  </a:schemeClr>
+                </a:solidFill>
+                <a:latin typeface="Calibri"/>
+              </a:rPr>
+              <a:t> </a:t>
+            </a:r>
+            <a:r>
+              <a:rPr lang="de-AT" sz="1000" dirty="0" smtClean="0">
+                <a:solidFill>
+                  <a:schemeClr val="bg1">
+                    <a:lumMod val="50000"/>
+                  </a:schemeClr>
+                </a:solidFill>
+                <a:latin typeface="Calibri"/>
+              </a:rPr>
+              <a:t>In</a:t>
+            </a:r>
+            <a:endParaRPr lang="de-AT" sz="1000" baseline="-25000" dirty="0">
+              <a:solidFill>
+                <a:schemeClr val="accent6">
+                  <a:lumMod val="75000"/>
+                </a:schemeClr>
+              </a:solidFill>
+            </a:endParaRPr>
+          </a:p>
+        </p:txBody>
+      </p:sp>
     </p:spTree>
     <p:extLst>
       <p:ext uri="{BB962C8B-B14F-4D97-AF65-F5344CB8AC3E}">
@@ -34633,7 +35007,7 @@
         </p:nvSpPr>
         <p:spPr>
           <a:xfrm rot="5400000" flipV="1">
-            <a:off x="1331320" y="3246504"/>
+            <a:off x="1752714" y="3246504"/>
             <a:ext cx="122794" cy="52889"/>
           </a:xfrm>
           <a:prstGeom prst="rtTriangle">
@@ -34684,7 +35058,7 @@
         </p:nvSpPr>
         <p:spPr>
           <a:xfrm rot="5400000" flipH="1" flipV="1">
-            <a:off x="1310352" y="2696093"/>
+            <a:off x="1731746" y="2696093"/>
             <a:ext cx="164723" cy="61249"/>
           </a:xfrm>
           <a:prstGeom prst="rtTriangle">
@@ -34737,7 +35111,7 @@
         </p:nvSpPr>
         <p:spPr bwMode="auto">
           <a:xfrm flipV="1">
-            <a:off x="1181872" y="2997897"/>
+            <a:off x="1603266" y="2997897"/>
             <a:ext cx="1222832" cy="0"/>
           </a:xfrm>
           <a:prstGeom prst="line">
@@ -34788,7 +35162,7 @@
         </p:nvSpPr>
         <p:spPr bwMode="auto">
           <a:xfrm>
-            <a:off x="1264250" y="2869121"/>
+            <a:off x="1685644" y="2869121"/>
             <a:ext cx="216023" cy="256425"/>
           </a:xfrm>
           <a:prstGeom prst="rect">
@@ -34840,7 +35214,7 @@
         </p:nvSpPr>
         <p:spPr>
           <a:xfrm rot="5400000" flipH="1" flipV="1">
-            <a:off x="1254382" y="2789262"/>
+            <a:off x="1675776" y="2789262"/>
             <a:ext cx="114402" cy="114135"/>
           </a:xfrm>
           <a:prstGeom prst="rtTriangle">
@@ -34892,7 +35266,7 @@
         <p:spPr>
           <a:xfrm>
             <a:off x="251520" y="1412776"/>
-            <a:ext cx="5647847" cy="3354765"/>
+            <a:ext cx="8640960" cy="3354765"/>
           </a:xfrm>
           <a:prstGeom prst="rect">
             <a:avLst/>
@@ -35062,7 +35436,15 @@
             </a:r>
             <a:r>
               <a:rPr lang="en-GB" b="0" dirty="0" smtClean="0"/>
-              <a:t>to 1 (= 100%)</a:t>
+              <a:t>to 1 (= 100%) because losses are covered by .</a:t>
+            </a:r>
+            <a:r>
+              <a:rPr lang="en-GB" b="0" dirty="0" err="1" smtClean="0"/>
+              <a:t>vtcc</a:t>
+            </a:r>
+            <a:r>
+              <a:rPr lang="en-GB" b="0" dirty="0" smtClean="0"/>
+              <a:t> file</a:t>
             </a:r>
             <a:endParaRPr lang="en-GB" b="0" dirty="0"/>
           </a:p>
@@ -35257,7 +35639,7 @@
           <a:p>
             <a:pPr eaLnBrk="1" hangingPunct="1"/>
             <a:r>
-              <a:rPr lang="en-GB" sz="2800" b="0" dirty="0" smtClean="0"/>
+              <a:rPr lang="en-GB" sz="2800" dirty="0" smtClean="0"/>
               <a:t>Toque Converter Setup</a:t>
             </a:r>
             <a:endParaRPr lang="en-GB" sz="2800" kern="0" dirty="0"/>
@@ -35756,7 +36138,7 @@
         </p:nvSpPr>
         <p:spPr bwMode="auto">
           <a:xfrm>
-            <a:off x="1417702" y="2655962"/>
+            <a:off x="1839096" y="2655962"/>
             <a:ext cx="870339" cy="539042"/>
           </a:xfrm>
           <a:prstGeom prst="rect">
@@ -35810,7 +36192,7 @@
         </p:nvSpPr>
         <p:spPr bwMode="auto">
           <a:xfrm>
-            <a:off x="1417702" y="3069157"/>
+            <a:off x="1839096" y="3069157"/>
             <a:ext cx="1109907" cy="265188"/>
           </a:xfrm>
           <a:prstGeom prst="rect">
@@ -35864,7 +36246,7 @@
         </p:nvSpPr>
         <p:spPr bwMode="auto">
           <a:xfrm>
-            <a:off x="1364470" y="2784243"/>
+            <a:off x="1785864" y="2784243"/>
             <a:ext cx="216023" cy="427308"/>
           </a:xfrm>
           <a:prstGeom prst="rect">
@@ -35916,7 +36298,7 @@
         </p:nvSpPr>
         <p:spPr>
           <a:xfrm rot="5400000" flipV="1">
-            <a:off x="1273058" y="3107003"/>
+            <a:off x="1694452" y="3107003"/>
             <a:ext cx="72871" cy="109957"/>
           </a:xfrm>
           <a:prstGeom prst="rtTriangle">
@@ -35967,8 +36349,8 @@
         </p:nvSpPr>
         <p:spPr>
           <a:xfrm rot="5400000" flipH="1" flipV="1">
-            <a:off x="2143500" y="2522000"/>
-            <a:ext cx="51772" cy="242074"/>
+            <a:off x="2575658" y="2529321"/>
+            <a:ext cx="68053" cy="242074"/>
           </a:xfrm>
           <a:prstGeom prst="rtTriangle">
             <a:avLst/>
@@ -36020,7 +36402,7 @@
         </p:nvSpPr>
         <p:spPr bwMode="auto">
           <a:xfrm>
-            <a:off x="2281799" y="2624980"/>
+            <a:off x="2703193" y="2624980"/>
             <a:ext cx="245810" cy="488283"/>
           </a:xfrm>
           <a:prstGeom prst="rect">
@@ -36072,7 +36454,7 @@
         </p:nvCxnSpPr>
         <p:spPr>
           <a:xfrm flipH="1">
-            <a:off x="2281870" y="2617246"/>
+            <a:off x="2703264" y="2617246"/>
             <a:ext cx="245375" cy="0"/>
           </a:xfrm>
           <a:prstGeom prst="line">
@@ -36108,7 +36490,7 @@
         </p:nvCxnSpPr>
         <p:spPr>
           <a:xfrm flipH="1">
-            <a:off x="1417704" y="3332341"/>
+            <a:off x="1839098" y="3332341"/>
             <a:ext cx="1109905" cy="0"/>
           </a:xfrm>
           <a:prstGeom prst="line">
@@ -36144,8 +36526,8 @@
         </p:nvCxnSpPr>
         <p:spPr>
           <a:xfrm flipH="1">
-            <a:off x="2114378" y="2616332"/>
-            <a:ext cx="173664" cy="39630"/>
+            <a:off x="2519275" y="2616332"/>
+            <a:ext cx="190161" cy="38762"/>
           </a:xfrm>
           <a:prstGeom prst="line">
             <a:avLst/>
@@ -36180,7 +36562,7 @@
         </p:nvCxnSpPr>
         <p:spPr>
           <a:xfrm flipH="1">
-            <a:off x="1417704" y="2655962"/>
+            <a:off x="1839098" y="2655962"/>
             <a:ext cx="696675" cy="0"/>
           </a:xfrm>
           <a:prstGeom prst="line">
@@ -36216,7 +36598,7 @@
         </p:nvCxnSpPr>
         <p:spPr>
           <a:xfrm flipH="1" flipV="1">
-            <a:off x="1364470" y="3201751"/>
+            <a:off x="1785864" y="3201751"/>
             <a:ext cx="53233" cy="137273"/>
           </a:xfrm>
           <a:prstGeom prst="line">
@@ -36288,7 +36670,7 @@
         </p:nvCxnSpPr>
         <p:spPr>
           <a:xfrm flipV="1">
-            <a:off x="2519736" y="2620378"/>
+            <a:off x="2941130" y="2620378"/>
             <a:ext cx="0" cy="714344"/>
           </a:xfrm>
           <a:prstGeom prst="line">
@@ -36395,7 +36777,7 @@
             <a:r>
               <a:rPr lang="en-GB" sz="1200" dirty="0" err="1" smtClean="0">
                 <a:solidFill>
-                  <a:schemeClr val="accent5">
+                  <a:schemeClr val="accent6">
                     <a:lumMod val="75000"/>
                   </a:schemeClr>
                 </a:solidFill>
@@ -36405,7 +36787,7 @@
             <a:r>
               <a:rPr lang="en-GB" sz="1200" baseline="-25000" dirty="0" err="1" smtClean="0">
                 <a:solidFill>
-                  <a:schemeClr val="accent5">
+                  <a:schemeClr val="accent6">
                     <a:lumMod val="75000"/>
                   </a:schemeClr>
                 </a:solidFill>
@@ -36509,7 +36891,7 @@
             <a:r>
               <a:rPr lang="de-AT" sz="1200" dirty="0" err="1" smtClean="0">
                 <a:solidFill>
-                  <a:schemeClr val="accent5">
+                  <a:schemeClr val="accent6">
                     <a:lumMod val="75000"/>
                   </a:schemeClr>
                 </a:solidFill>
@@ -36520,7 +36902,7 @@
             <a:r>
               <a:rPr lang="de-AT" sz="1200" baseline="-25000" dirty="0" err="1" smtClean="0">
                 <a:solidFill>
-                  <a:schemeClr val="accent5">
+                  <a:schemeClr val="accent6">
                     <a:lumMod val="75000"/>
                   </a:schemeClr>
                 </a:solidFill>
@@ -36940,7 +37322,7 @@
         </p:nvSpPr>
         <p:spPr>
           <a:xfrm>
-            <a:off x="2566432" y="3515360"/>
+            <a:off x="2845980" y="3515360"/>
             <a:ext cx="640321" cy="401007"/>
           </a:xfrm>
           <a:prstGeom prst="rect">
@@ -37029,8 +37411,8 @@
         </p:nvSpPr>
         <p:spPr>
           <a:xfrm>
-            <a:off x="539552" y="3503448"/>
-            <a:ext cx="822537" cy="384078"/>
+            <a:off x="899592" y="3503448"/>
+            <a:ext cx="932929" cy="384078"/>
           </a:xfrm>
           <a:prstGeom prst="rect">
             <a:avLst/>
@@ -37051,7 +37433,7 @@
             <a:r>
               <a:rPr lang="en-GB" sz="1200" dirty="0" err="1" smtClean="0">
                 <a:solidFill>
-                  <a:schemeClr val="accent5">
+                  <a:schemeClr val="accent6">
                     <a:lumMod val="75000"/>
                   </a:schemeClr>
                 </a:solidFill>
@@ -37061,7 +37443,7 @@
             <a:r>
               <a:rPr lang="en-GB" sz="1200" baseline="-25000" dirty="0" err="1" smtClean="0">
                 <a:solidFill>
-                  <a:schemeClr val="accent5">
+                  <a:schemeClr val="accent6">
                     <a:lumMod val="75000"/>
                   </a:schemeClr>
                 </a:solidFill>
@@ -37071,7 +37453,7 @@
             <a:r>
               <a:rPr lang="en-GB" sz="1200" dirty="0" smtClean="0">
                 <a:solidFill>
-                  <a:schemeClr val="accent5">
+                  <a:schemeClr val="accent6">
                     <a:lumMod val="75000"/>
                   </a:schemeClr>
                 </a:solidFill>
@@ -37081,7 +37463,7 @@
             <a:r>
               <a:rPr lang="de-AT" sz="1200" dirty="0" err="1" smtClean="0">
                 <a:solidFill>
-                  <a:schemeClr val="accent5">
+                  <a:schemeClr val="accent6">
                     <a:lumMod val="75000"/>
                   </a:schemeClr>
                 </a:solidFill>
@@ -37092,7 +37474,7 @@
             <a:r>
               <a:rPr lang="de-AT" sz="1200" baseline="-25000" dirty="0" err="1" smtClean="0">
                 <a:solidFill>
-                  <a:schemeClr val="accent5">
+                  <a:schemeClr val="accent6">
                     <a:lumMod val="75000"/>
                   </a:schemeClr>
                 </a:solidFill>
@@ -37100,10 +37482,10 @@
               </a:rPr>
               <a:t>out</a:t>
             </a:r>
-            <a:endParaRPr lang="de-AT" sz="1200" baseline="-25000" dirty="0">
+            <a:endParaRPr lang="de-AT" sz="1000" baseline="-25000" dirty="0">
               <a:solidFill>
-                <a:schemeClr val="accent5">
-                  <a:lumMod val="75000"/>
+                <a:schemeClr val="bg1">
+                  <a:lumMod val="50000"/>
                 </a:schemeClr>
               </a:solidFill>
             </a:endParaRPr>
@@ -37118,7 +37500,7 @@
         </p:nvCxnSpPr>
         <p:spPr bwMode="auto">
           <a:xfrm flipV="1">
-            <a:off x="933450" y="3069158"/>
+            <a:off x="1354844" y="3069158"/>
             <a:ext cx="148767" cy="512242"/>
           </a:xfrm>
           <a:prstGeom prst="line">
@@ -37158,7 +37540,7 @@
         </p:nvCxnSpPr>
         <p:spPr bwMode="auto">
           <a:xfrm flipH="1" flipV="1">
-            <a:off x="2713998" y="3069158"/>
+            <a:off x="2993546" y="3069158"/>
             <a:ext cx="124452" cy="531292"/>
           </a:xfrm>
           <a:prstGeom prst="line">
@@ -37263,7 +37645,7 @@
         </p:nvCxnSpPr>
         <p:spPr>
           <a:xfrm flipV="1">
-            <a:off x="1254515" y="2881288"/>
+            <a:off x="1675909" y="2881288"/>
             <a:ext cx="0" cy="244258"/>
           </a:xfrm>
           <a:prstGeom prst="line">
@@ -37299,7 +37681,7 @@
         </p:nvCxnSpPr>
         <p:spPr>
           <a:xfrm flipV="1">
-            <a:off x="1254515" y="2786166"/>
+            <a:off x="1675909" y="2786166"/>
             <a:ext cx="109955" cy="95121"/>
           </a:xfrm>
           <a:prstGeom prst="line">
@@ -37335,7 +37717,7 @@
         </p:nvCxnSpPr>
         <p:spPr>
           <a:xfrm flipH="1" flipV="1">
-            <a:off x="1254515" y="3125546"/>
+            <a:off x="1675909" y="3125546"/>
             <a:ext cx="109955" cy="77374"/>
           </a:xfrm>
           <a:prstGeom prst="line">
@@ -37373,7 +37755,7 @@
         </p:nvCxnSpPr>
         <p:spPr>
           <a:xfrm flipV="1">
-            <a:off x="1368651" y="2650064"/>
+            <a:off x="1790045" y="2650064"/>
             <a:ext cx="49053" cy="139065"/>
           </a:xfrm>
           <a:prstGeom prst="line">
@@ -37409,7 +37791,7 @@
         </p:nvSpPr>
         <p:spPr bwMode="auto">
           <a:xfrm rot="5400000">
-            <a:off x="1647095" y="2846441"/>
+            <a:off x="2068489" y="2846441"/>
             <a:ext cx="612492" cy="306467"/>
           </a:xfrm>
           <a:prstGeom prst="roundRect">
@@ -37465,7 +37847,7 @@
         </p:nvSpPr>
         <p:spPr bwMode="auto">
           <a:xfrm>
-            <a:off x="1828490" y="2867151"/>
+            <a:off x="2249884" y="2867151"/>
             <a:ext cx="249702" cy="261610"/>
           </a:xfrm>
           <a:prstGeom prst="rect">
@@ -37542,7 +37924,7 @@
         </p:nvCxnSpPr>
         <p:spPr bwMode="auto">
           <a:xfrm flipH="1">
-            <a:off x="2564260" y="3002201"/>
+            <a:off x="2843808" y="3002201"/>
             <a:ext cx="207540" cy="0"/>
           </a:xfrm>
           <a:prstGeom prst="straightConnector1">
@@ -37582,7 +37964,7 @@
         </p:nvCxnSpPr>
         <p:spPr bwMode="auto">
           <a:xfrm flipH="1">
-            <a:off x="913434" y="3003417"/>
+            <a:off x="1334828" y="3003417"/>
             <a:ext cx="207540" cy="0"/>
           </a:xfrm>
           <a:prstGeom prst="straightConnector1">
@@ -37614,6 +37996,213 @@
           </a:extLst>
         </p:spPr>
       </p:cxnSp>
+      <p:sp>
+        <p:nvSpPr>
+          <p:cNvPr id="56" name="Textfeld 55"/>
+          <p:cNvSpPr txBox="1"/>
+          <p:nvPr/>
+        </p:nvSpPr>
+        <p:spPr>
+          <a:xfrm>
+            <a:off x="5652120" y="3512041"/>
+            <a:ext cx="2071977" cy="276999"/>
+          </a:xfrm>
+          <a:prstGeom prst="rect">
+            <a:avLst/>
+          </a:prstGeom>
+          <a:noFill/>
+          <a:ln>
+            <a:noFill/>
+          </a:ln>
+        </p:spPr>
+        <p:txBody>
+          <a:bodyPr wrap="none" rtlCol="0">
+            <a:spAutoFit/>
+          </a:bodyPr>
+          <a:lstStyle/>
+          <a:p>
+            <a:pPr algn="l">
+              <a:spcBef>
+                <a:spcPts val="0"/>
+              </a:spcBef>
+            </a:pPr>
+            <a:r>
+              <a:rPr lang="en-GB" sz="1200" b="0" dirty="0" smtClean="0"/>
+              <a:t>Torque Converter file (.</a:t>
+            </a:r>
+            <a:r>
+              <a:rPr lang="en-GB" sz="1200" b="0" dirty="0" err="1" smtClean="0"/>
+              <a:t>vtcc</a:t>
+            </a:r>
+            <a:r>
+              <a:rPr lang="en-GB" sz="1200" b="0" dirty="0" smtClean="0"/>
+              <a:t>)</a:t>
+            </a:r>
+          </a:p>
+        </p:txBody>
+      </p:sp>
+      <p:sp>
+        <p:nvSpPr>
+          <p:cNvPr id="63" name="Textfeld 62"/>
+          <p:cNvSpPr txBox="1"/>
+          <p:nvPr/>
+        </p:nvSpPr>
+        <p:spPr>
+          <a:xfrm>
+            <a:off x="970666" y="3732530"/>
+            <a:ext cx="1009046" cy="384078"/>
+          </a:xfrm>
+          <a:prstGeom prst="rect">
+            <a:avLst/>
+          </a:prstGeom>
+          <a:noFill/>
+        </p:spPr>
+        <p:txBody>
+          <a:bodyPr wrap="square" rtlCol="0">
+            <a:noAutofit/>
+          </a:bodyPr>
+          <a:lstStyle/>
+          <a:p>
+            <a:pPr>
+              <a:lnSpc>
+                <a:spcPct val="150000"/>
+              </a:lnSpc>
+            </a:pPr>
+            <a:r>
+              <a:rPr lang="de-AT" sz="1000" dirty="0" smtClean="0">
+                <a:solidFill>
+                  <a:schemeClr val="bg1">
+                    <a:lumMod val="50000"/>
+                  </a:schemeClr>
+                </a:solidFill>
+                <a:latin typeface="Calibri"/>
+              </a:rPr>
+              <a:t>= </a:t>
+            </a:r>
+            <a:r>
+              <a:rPr lang="de-AT" sz="1000" dirty="0" err="1">
+                <a:solidFill>
+                  <a:schemeClr val="bg1">
+                    <a:lumMod val="50000"/>
+                  </a:schemeClr>
+                </a:solidFill>
+                <a:latin typeface="Calibri"/>
+              </a:rPr>
+              <a:t>Gearbox</a:t>
+            </a:r>
+            <a:r>
+              <a:rPr lang="de-AT" sz="1000" dirty="0">
+                <a:solidFill>
+                  <a:schemeClr val="bg1">
+                    <a:lumMod val="50000"/>
+                  </a:schemeClr>
+                </a:solidFill>
+                <a:latin typeface="Calibri"/>
+              </a:rPr>
+              <a:t> </a:t>
+            </a:r>
+            <a:r>
+              <a:rPr lang="de-AT" sz="1000" dirty="0" smtClean="0">
+                <a:solidFill>
+                  <a:schemeClr val="bg1">
+                    <a:lumMod val="50000"/>
+                  </a:schemeClr>
+                </a:solidFill>
+                <a:latin typeface="Calibri"/>
+              </a:rPr>
+              <a:t>Out</a:t>
+            </a:r>
+            <a:endParaRPr lang="de-AT" sz="1000" baseline="-25000" dirty="0">
+              <a:solidFill>
+                <a:schemeClr val="accent6">
+                  <a:lumMod val="75000"/>
+                </a:schemeClr>
+              </a:solidFill>
+            </a:endParaRPr>
+          </a:p>
+        </p:txBody>
+      </p:sp>
+      <p:sp>
+        <p:nvSpPr>
+          <p:cNvPr id="64" name="Textfeld 63"/>
+          <p:cNvSpPr txBox="1"/>
+          <p:nvPr/>
+        </p:nvSpPr>
+        <p:spPr>
+          <a:xfrm>
+            <a:off x="2786364" y="3735339"/>
+            <a:ext cx="1009046" cy="384078"/>
+          </a:xfrm>
+          <a:prstGeom prst="rect">
+            <a:avLst/>
+          </a:prstGeom>
+          <a:noFill/>
+        </p:spPr>
+        <p:txBody>
+          <a:bodyPr wrap="square" rtlCol="0">
+            <a:noAutofit/>
+          </a:bodyPr>
+          <a:lstStyle/>
+          <a:p>
+            <a:pPr>
+              <a:lnSpc>
+                <a:spcPct val="150000"/>
+              </a:lnSpc>
+            </a:pPr>
+            <a:r>
+              <a:rPr lang="de-AT" sz="1000" dirty="0" smtClean="0">
+                <a:solidFill>
+                  <a:schemeClr val="bg1">
+                    <a:lumMod val="50000"/>
+                  </a:schemeClr>
+                </a:solidFill>
+                <a:latin typeface="Calibri"/>
+              </a:rPr>
+              <a:t>= </a:t>
+            </a:r>
+            <a:r>
+              <a:rPr lang="de-AT" sz="1000" dirty="0" err="1">
+                <a:solidFill>
+                  <a:schemeClr val="bg1">
+                    <a:lumMod val="50000"/>
+                  </a:schemeClr>
+                </a:solidFill>
+                <a:latin typeface="Calibri"/>
+              </a:rPr>
+              <a:t>Gearbox</a:t>
+            </a:r>
+            <a:r>
+              <a:rPr lang="de-AT" sz="1000" dirty="0">
+                <a:solidFill>
+                  <a:schemeClr val="bg1">
+                    <a:lumMod val="50000"/>
+                  </a:schemeClr>
+                </a:solidFill>
+                <a:latin typeface="Calibri"/>
+              </a:rPr>
+              <a:t> </a:t>
+            </a:r>
+            <a:r>
+              <a:rPr lang="de-AT" sz="1000" dirty="0" smtClean="0">
+                <a:solidFill>
+                  <a:schemeClr val="bg1">
+                    <a:lumMod val="50000"/>
+                  </a:schemeClr>
+                </a:solidFill>
+                <a:latin typeface="Calibri"/>
+              </a:rPr>
+              <a:t>In</a:t>
+            </a:r>
+            <a:endParaRPr lang="de-AT" sz="1000" baseline="-25000" dirty="0">
+              <a:solidFill>
+                <a:schemeClr val="accent6">
+                  <a:lumMod val="75000"/>
+                </a:schemeClr>
+              </a:solidFill>
+            </a:endParaRPr>
+          </a:p>
+        </p:txBody>
+      </p:sp>
     </p:spTree>
     <p:extLst>
       <p:ext uri="{BB962C8B-B14F-4D97-AF65-F5344CB8AC3E}">
@@ -37833,11 +38422,11 @@
           <a:p>
             <a:pPr eaLnBrk="1" hangingPunct="1"/>
             <a:r>
-              <a:rPr lang="en-GB" sz="2800" b="0" dirty="0" smtClean="0"/>
+              <a:rPr lang="en-GB" sz="2800" dirty="0" smtClean="0"/>
               <a:t>Gearbox &amp; Toque </a:t>
             </a:r>
             <a:r>
-              <a:rPr lang="en-GB" sz="2800" b="0" dirty="0"/>
+              <a:rPr lang="en-GB" sz="2800" dirty="0"/>
               <a:t>Converter</a:t>
             </a:r>
             <a:endParaRPr lang="en-GB" sz="2800" kern="0" dirty="0"/>

</xml_diff>

<commit_message>
- compiled (temporary) release package
</commit_message>
<xml_diff>
--- a/User Manual Source/Update Notes.pptx
+++ b/User Manual Source/Update Notes.pptx
@@ -4486,13 +4486,18 @@
           <a:p>
             <a:pPr eaLnBrk="1" hangingPunct="1"/>
             <a:r>
-              <a:rPr lang="en-US" sz="2000" dirty="0" smtClean="0">
+              <a:rPr lang="en-US" sz="2000" smtClean="0">
                 <a:solidFill>
                   <a:srgbClr val="990000"/>
                 </a:solidFill>
               </a:rPr>
-              <a:t>04.09.2013</a:t>
-            </a:r>
+              <a:t>07.10.2013</a:t>
+            </a:r>
+            <a:endParaRPr lang="en-US" sz="2000" dirty="0" smtClean="0">
+              <a:solidFill>
+                <a:srgbClr val="990000"/>
+              </a:solidFill>
+            </a:endParaRPr>
           </a:p>
           <a:p>
             <a:pPr eaLnBrk="1" hangingPunct="1"/>
@@ -7673,7 +7678,7 @@
 </file>
 
 <file path=ppt/slides/slide13.xml><?xml version="1.0" encoding="utf-8"?>
-<p:sld xmlns:a="http://schemas.openxmlformats.org/drawingml/2006/main" xmlns:r="http://schemas.openxmlformats.org/officeDocument/2006/relationships" xmlns:p="http://schemas.openxmlformats.org/presentationml/2006/main" show="0">
+<p:sld xmlns:a="http://schemas.openxmlformats.org/drawingml/2006/main" xmlns:r="http://schemas.openxmlformats.org/officeDocument/2006/relationships" xmlns:p="http://schemas.openxmlformats.org/presentationml/2006/main">
   <p:cSld>
     <p:spTree>
       <p:nvGrpSpPr>
@@ -8016,7 +8021,7 @@
 </file>
 
 <file path=ppt/slides/slide14.xml><?xml version="1.0" encoding="utf-8"?>
-<p:sld xmlns:a="http://schemas.openxmlformats.org/drawingml/2006/main" xmlns:r="http://schemas.openxmlformats.org/officeDocument/2006/relationships" xmlns:p="http://schemas.openxmlformats.org/presentationml/2006/main" show="0">
+<p:sld xmlns:a="http://schemas.openxmlformats.org/drawingml/2006/main" xmlns:r="http://schemas.openxmlformats.org/officeDocument/2006/relationships" xmlns:p="http://schemas.openxmlformats.org/presentationml/2006/main">
   <p:cSld>
     <p:spTree>
       <p:nvGrpSpPr>
@@ -9215,7 +9220,6 @@
               <a:rPr lang="en-GB" sz="1200" b="0" dirty="0"/>
               <a:t>rolling resistance coefficient</a:t>
             </a:r>
-            <a:endParaRPr lang="en-GB" sz="1200" b="0" dirty="0"/>
           </a:p>
         </p:txBody>
       </p:sp>

</xml_diff>

<commit_message>
Release: REAPPLY CSET(afd24a020bac) mistakenly gone into bodysigs branch, * Set ver for release from 1.4 --> 1.4.RC4, * Updated Update Notes, * DID NOT moved VECTO_LIC project's dir, in 'default' branch not belonging (yet:-) to the solution.
</commit_message>
<xml_diff>
--- a/User Manual Source/Update Notes.pptx
+++ b/User Manual Source/Update Notes.pptx
@@ -4480,24 +4480,19 @@
                   <a:srgbClr val="990000"/>
                 </a:solidFill>
               </a:rPr>
-              <a:t>VECTO 1.4</a:t>
+              <a:t>VECTO 1.4 RC4</a:t>
             </a:r>
           </a:p>
           <a:p>
             <a:pPr eaLnBrk="1" hangingPunct="1"/>
             <a:r>
-              <a:rPr lang="en-US" sz="2000" smtClean="0">
+              <a:rPr lang="en-US" sz="2000" dirty="0" smtClean="0">
                 <a:solidFill>
                   <a:srgbClr val="990000"/>
                 </a:solidFill>
               </a:rPr>
-              <a:t>07.10.2013</a:t>
-            </a:r>
-            <a:endParaRPr lang="en-US" sz="2000" dirty="0" smtClean="0">
-              <a:solidFill>
-                <a:srgbClr val="990000"/>
-              </a:solidFill>
-            </a:endParaRPr>
+              <a:t>10.10.2013</a:t>
+            </a:r>
           </a:p>
           <a:p>
             <a:pPr eaLnBrk="1" hangingPunct="1"/>
@@ -7678,7 +7673,7 @@
 </file>
 
 <file path=ppt/slides/slide13.xml><?xml version="1.0" encoding="utf-8"?>
-<p:sld xmlns:a="http://schemas.openxmlformats.org/drawingml/2006/main" xmlns:r="http://schemas.openxmlformats.org/officeDocument/2006/relationships" xmlns:p="http://schemas.openxmlformats.org/presentationml/2006/main">
+<p:sld xmlns:a="http://schemas.openxmlformats.org/drawingml/2006/main" xmlns:r="http://schemas.openxmlformats.org/officeDocument/2006/relationships" xmlns:p="http://schemas.openxmlformats.org/presentationml/2006/main" show="0">
   <p:cSld>
     <p:spTree>
       <p:nvGrpSpPr>
@@ -8021,7 +8016,7 @@
 </file>
 
 <file path=ppt/slides/slide14.xml><?xml version="1.0" encoding="utf-8"?>
-<p:sld xmlns:a="http://schemas.openxmlformats.org/drawingml/2006/main" xmlns:r="http://schemas.openxmlformats.org/officeDocument/2006/relationships" xmlns:p="http://schemas.openxmlformats.org/presentationml/2006/main">
+<p:sld xmlns:a="http://schemas.openxmlformats.org/drawingml/2006/main" xmlns:r="http://schemas.openxmlformats.org/officeDocument/2006/relationships" xmlns:p="http://schemas.openxmlformats.org/presentationml/2006/main" show="0">
   <p:cSld>
     <p:spTree>
       <p:nvGrpSpPr>
@@ -10936,7 +10931,7 @@
         <p:spPr>
           <a:xfrm>
             <a:off x="251520" y="1313467"/>
-            <a:ext cx="8496944" cy="3754874"/>
+            <a:ext cx="8496944" cy="3354765"/>
           </a:xfrm>
           <a:prstGeom prst="rect">
             <a:avLst/>
@@ -11136,22 +11131,6 @@
             <a:r>
               <a:rPr lang="en-GB" sz="1400" b="0" dirty="0"/>
               <a:t>job file</a:t>
-            </a:r>
-          </a:p>
-          <a:p>
-            <a:pPr marL="342900" indent="-342900" algn="l">
-              <a:lnSpc>
-                <a:spcPct val="150000"/>
-              </a:lnSpc>
-              <a:spcBef>
-                <a:spcPts val="600"/>
-              </a:spcBef>
-              <a:buFont typeface="Arial" pitchFamily="34" charset="0"/>
-              <a:buChar char="•"/>
-            </a:pPr>
-            <a:r>
-              <a:rPr lang="en-GB" sz="1400" b="0" dirty="0" smtClean="0"/>
-              <a:t>File signing features added</a:t>
             </a:r>
           </a:p>
           <a:p>
@@ -11378,6 +11357,13 @@
   <p:clrMapOvr>
     <a:masterClrMapping/>
   </p:clrMapOvr>
+  <p:timing>
+    <p:tnLst>
+      <p:par>
+        <p:cTn id="1" dur="indefinite" restart="never" nodeType="tmRoot"/>
+      </p:par>
+    </p:tnLst>
+  </p:timing>
 </p:sld>
 </file>
 
@@ -23029,7 +23015,7 @@
         <p:spPr>
           <a:xfrm>
             <a:off x="251520" y="1631122"/>
-            <a:ext cx="8496944" cy="3108543"/>
+            <a:ext cx="8496944" cy="2800767"/>
           </a:xfrm>
           <a:prstGeom prst="rect">
             <a:avLst/>
@@ -23160,15 +23146,11 @@
             </a:r>
             <a:r>
               <a:rPr lang="en-GB" sz="2000" b="0" dirty="0" smtClean="0"/>
-              <a:t>interrupted temporary to correct distance. </a:t>
-            </a:r>
-            <a:r>
-              <a:rPr lang="en-GB" b="0" u="sng" dirty="0" smtClean="0">
-                <a:solidFill>
-                  <a:srgbClr val="FF0000"/>
-                </a:solidFill>
-              </a:rPr>
-              <a:t>(To be revised in future updates)</a:t>
+              <a:t>interrupted temporary to correct </a:t>
+            </a:r>
+            <a:r>
+              <a:rPr lang="en-GB" sz="2000" b="0" dirty="0" smtClean="0"/>
+              <a:t>distance</a:t>
             </a:r>
             <a:endParaRPr lang="en-GB" sz="2000" b="0" u="sng" dirty="0">
               <a:solidFill>
@@ -23188,6 +23170,13 @@
   <p:clrMapOvr>
     <a:masterClrMapping/>
   </p:clrMapOvr>
+  <p:timing>
+    <p:tnLst>
+      <p:par>
+        <p:cTn id="1" dur="indefinite" restart="never" nodeType="tmRoot"/>
+      </p:par>
+    </p:tnLst>
+  </p:timing>
 </p:sld>
 </file>
 

</xml_diff>